<commit_message>
lec 7 and 8
</commit_message>
<xml_diff>
--- a/images/coordinate_grids/Presentation1.pptx
+++ b/images/coordinate_grids/Presentation1.pptx
@@ -11,6 +11,7 @@
     <p:sldId id="259" r:id="rId5"/>
     <p:sldId id="260" r:id="rId6"/>
     <p:sldId id="261" r:id="rId7"/>
+    <p:sldId id="262" r:id="rId8"/>
   </p:sldIdLst>
   <p:sldSz cx="12192000" cy="6858000"/>
   <p:notesSz cx="6858000" cy="9144000"/>
@@ -120,6 +121,7 @@
             <p14:sldId id="259"/>
             <p14:sldId id="260"/>
             <p14:sldId id="261"/>
+            <p14:sldId id="262"/>
           </p14:sldIdLst>
         </p14:section>
       </p14:sectionLst>
@@ -278,7 +280,7 @@
           <a:p>
             <a:fld id="{165386A8-AF9F-7E40-A1FF-AF0D5444A8FE}" type="datetimeFigureOut">
               <a:rPr lang="en-US" smtClean="0"/>
-              <a:t>7/20/19</a:t>
+              <a:t>7/26/19</a:t>
             </a:fld>
             <a:endParaRPr lang="en-US"/>
           </a:p>
@@ -476,7 +478,7 @@
           <a:p>
             <a:fld id="{165386A8-AF9F-7E40-A1FF-AF0D5444A8FE}" type="datetimeFigureOut">
               <a:rPr lang="en-US" smtClean="0"/>
-              <a:t>7/20/19</a:t>
+              <a:t>7/26/19</a:t>
             </a:fld>
             <a:endParaRPr lang="en-US"/>
           </a:p>
@@ -684,7 +686,7 @@
           <a:p>
             <a:fld id="{165386A8-AF9F-7E40-A1FF-AF0D5444A8FE}" type="datetimeFigureOut">
               <a:rPr lang="en-US" smtClean="0"/>
-              <a:t>7/20/19</a:t>
+              <a:t>7/26/19</a:t>
             </a:fld>
             <a:endParaRPr lang="en-US"/>
           </a:p>
@@ -882,7 +884,7 @@
           <a:p>
             <a:fld id="{165386A8-AF9F-7E40-A1FF-AF0D5444A8FE}" type="datetimeFigureOut">
               <a:rPr lang="en-US" smtClean="0"/>
-              <a:t>7/20/19</a:t>
+              <a:t>7/26/19</a:t>
             </a:fld>
             <a:endParaRPr lang="en-US"/>
           </a:p>
@@ -1157,7 +1159,7 @@
           <a:p>
             <a:fld id="{165386A8-AF9F-7E40-A1FF-AF0D5444A8FE}" type="datetimeFigureOut">
               <a:rPr lang="en-US" smtClean="0"/>
-              <a:t>7/20/19</a:t>
+              <a:t>7/26/19</a:t>
             </a:fld>
             <a:endParaRPr lang="en-US"/>
           </a:p>
@@ -1422,7 +1424,7 @@
           <a:p>
             <a:fld id="{165386A8-AF9F-7E40-A1FF-AF0D5444A8FE}" type="datetimeFigureOut">
               <a:rPr lang="en-US" smtClean="0"/>
-              <a:t>7/20/19</a:t>
+              <a:t>7/26/19</a:t>
             </a:fld>
             <a:endParaRPr lang="en-US"/>
           </a:p>
@@ -1834,7 +1836,7 @@
           <a:p>
             <a:fld id="{165386A8-AF9F-7E40-A1FF-AF0D5444A8FE}" type="datetimeFigureOut">
               <a:rPr lang="en-US" smtClean="0"/>
-              <a:t>7/20/19</a:t>
+              <a:t>7/26/19</a:t>
             </a:fld>
             <a:endParaRPr lang="en-US"/>
           </a:p>
@@ -1975,7 +1977,7 @@
           <a:p>
             <a:fld id="{165386A8-AF9F-7E40-A1FF-AF0D5444A8FE}" type="datetimeFigureOut">
               <a:rPr lang="en-US" smtClean="0"/>
-              <a:t>7/20/19</a:t>
+              <a:t>7/26/19</a:t>
             </a:fld>
             <a:endParaRPr lang="en-US"/>
           </a:p>
@@ -2088,7 +2090,7 @@
           <a:p>
             <a:fld id="{165386A8-AF9F-7E40-A1FF-AF0D5444A8FE}" type="datetimeFigureOut">
               <a:rPr lang="en-US" smtClean="0"/>
-              <a:t>7/20/19</a:t>
+              <a:t>7/26/19</a:t>
             </a:fld>
             <a:endParaRPr lang="en-US"/>
           </a:p>
@@ -2399,7 +2401,7 @@
           <a:p>
             <a:fld id="{165386A8-AF9F-7E40-A1FF-AF0D5444A8FE}" type="datetimeFigureOut">
               <a:rPr lang="en-US" smtClean="0"/>
-              <a:t>7/20/19</a:t>
+              <a:t>7/26/19</a:t>
             </a:fld>
             <a:endParaRPr lang="en-US"/>
           </a:p>
@@ -2687,7 +2689,7 @@
           <a:p>
             <a:fld id="{165386A8-AF9F-7E40-A1FF-AF0D5444A8FE}" type="datetimeFigureOut">
               <a:rPr lang="en-US" smtClean="0"/>
-              <a:t>7/20/19</a:t>
+              <a:t>7/26/19</a:t>
             </a:fld>
             <a:endParaRPr lang="en-US"/>
           </a:p>
@@ -2928,7 +2930,7 @@
           <a:p>
             <a:fld id="{165386A8-AF9F-7E40-A1FF-AF0D5444A8FE}" type="datetimeFigureOut">
               <a:rPr lang="en-US" smtClean="0"/>
-              <a:t>7/20/19</a:t>
+              <a:t>7/26/19</a:t>
             </a:fld>
             <a:endParaRPr lang="en-US"/>
           </a:p>
@@ -6259,6 +6261,454 @@
 </p:sld>
 </file>
 
+<file path=ppt/slides/slide7.xml><?xml version="1.0" encoding="utf-8"?>
+<p:sld xmlns:a="http://schemas.openxmlformats.org/drawingml/2006/main" xmlns:r="http://schemas.openxmlformats.org/officeDocument/2006/relationships" xmlns:p="http://schemas.openxmlformats.org/presentationml/2006/main">
+  <p:cSld>
+    <p:spTree>
+      <p:nvGrpSpPr>
+        <p:cNvPr id="1" name=""/>
+        <p:cNvGrpSpPr/>
+        <p:nvPr/>
+      </p:nvGrpSpPr>
+      <p:grpSpPr>
+        <a:xfrm>
+          <a:off x="0" y="0"/>
+          <a:ext cx="0" cy="0"/>
+          <a:chOff x="0" y="0"/>
+          <a:chExt cx="0" cy="0"/>
+        </a:xfrm>
+      </p:grpSpPr>
+      <p:grpSp>
+        <p:nvGrpSpPr>
+          <p:cNvPr id="22" name="Group 21">
+            <a:extLst>
+              <a:ext uri="{FF2B5EF4-FFF2-40B4-BE49-F238E27FC236}">
+                <a16:creationId xmlns:a16="http://schemas.microsoft.com/office/drawing/2014/main" id="{06C42A2C-8A89-D24C-88C5-6CAB3B4ADF74}"/>
+              </a:ext>
+            </a:extLst>
+          </p:cNvPr>
+          <p:cNvGrpSpPr/>
+          <p:nvPr/>
+        </p:nvGrpSpPr>
+        <p:grpSpPr>
+          <a:xfrm>
+            <a:off x="2768600" y="327070"/>
+            <a:ext cx="6654800" cy="6667500"/>
+            <a:chOff x="2768600" y="327070"/>
+            <a:chExt cx="6654800" cy="6667500"/>
+          </a:xfrm>
+        </p:grpSpPr>
+        <p:pic>
+          <p:nvPicPr>
+            <p:cNvPr id="5" name="Picture 4">
+              <a:extLst>
+                <a:ext uri="{FF2B5EF4-FFF2-40B4-BE49-F238E27FC236}">
+                  <a16:creationId xmlns:a16="http://schemas.microsoft.com/office/drawing/2014/main" id="{35DEA2A6-DAE0-CA42-AEFB-FBC020B96D3D}"/>
+                </a:ext>
+              </a:extLst>
+            </p:cNvPr>
+            <p:cNvPicPr>
+              <a:picLocks noChangeAspect="1"/>
+            </p:cNvPicPr>
+            <p:nvPr/>
+          </p:nvPicPr>
+          <p:blipFill>
+            <a:blip r:embed="rId2"/>
+            <a:stretch>
+              <a:fillRect/>
+            </a:stretch>
+          </p:blipFill>
+          <p:spPr>
+            <a:xfrm>
+              <a:off x="2768600" y="327070"/>
+              <a:ext cx="6654800" cy="6667500"/>
+            </a:xfrm>
+            <a:prstGeom prst="rect">
+              <a:avLst/>
+            </a:prstGeom>
+          </p:spPr>
+        </p:pic>
+        <p:pic>
+          <p:nvPicPr>
+            <p:cNvPr id="6" name="Picture 5">
+              <a:extLst>
+                <a:ext uri="{FF2B5EF4-FFF2-40B4-BE49-F238E27FC236}">
+                  <a16:creationId xmlns:a16="http://schemas.microsoft.com/office/drawing/2014/main" id="{61BE0E7E-86BA-B24A-90E0-47D5AF23BC81}"/>
+                </a:ext>
+              </a:extLst>
+            </p:cNvPr>
+            <p:cNvPicPr>
+              <a:picLocks noChangeAspect="1"/>
+            </p:cNvPicPr>
+            <p:nvPr/>
+          </p:nvPicPr>
+          <p:blipFill>
+            <a:blip r:embed="rId3"/>
+            <a:stretch>
+              <a:fillRect/>
+            </a:stretch>
+          </p:blipFill>
+          <p:spPr>
+            <a:xfrm>
+              <a:off x="7149832" y="1813194"/>
+              <a:ext cx="2133600" cy="406400"/>
+            </a:xfrm>
+            <a:prstGeom prst="rect">
+              <a:avLst/>
+            </a:prstGeom>
+          </p:spPr>
+        </p:pic>
+        <p:pic>
+          <p:nvPicPr>
+            <p:cNvPr id="7" name="Picture 6">
+              <a:extLst>
+                <a:ext uri="{FF2B5EF4-FFF2-40B4-BE49-F238E27FC236}">
+                  <a16:creationId xmlns:a16="http://schemas.microsoft.com/office/drawing/2014/main" id="{C599C07B-A2BA-2548-BAAD-87CB1A8C6950}"/>
+                </a:ext>
+              </a:extLst>
+            </p:cNvPr>
+            <p:cNvPicPr>
+              <a:picLocks noChangeAspect="1"/>
+            </p:cNvPicPr>
+            <p:nvPr/>
+          </p:nvPicPr>
+          <p:blipFill>
+            <a:blip r:embed="rId4"/>
+            <a:stretch>
+              <a:fillRect/>
+            </a:stretch>
+          </p:blipFill>
+          <p:spPr>
+            <a:xfrm>
+              <a:off x="6794679" y="4281868"/>
+              <a:ext cx="457200" cy="406400"/>
+            </a:xfrm>
+            <a:prstGeom prst="rect">
+              <a:avLst/>
+            </a:prstGeom>
+          </p:spPr>
+        </p:pic>
+        <p:pic>
+          <p:nvPicPr>
+            <p:cNvPr id="8" name="Picture 7">
+              <a:extLst>
+                <a:ext uri="{FF2B5EF4-FFF2-40B4-BE49-F238E27FC236}">
+                  <a16:creationId xmlns:a16="http://schemas.microsoft.com/office/drawing/2014/main" id="{9E584D39-84C8-A84E-ADBA-2F692EB39545}"/>
+                </a:ext>
+              </a:extLst>
+            </p:cNvPr>
+            <p:cNvPicPr>
+              <a:picLocks noChangeAspect="1"/>
+            </p:cNvPicPr>
+            <p:nvPr/>
+          </p:nvPicPr>
+          <p:blipFill>
+            <a:blip r:embed="rId5"/>
+            <a:stretch>
+              <a:fillRect/>
+            </a:stretch>
+          </p:blipFill>
+          <p:spPr>
+            <a:xfrm>
+              <a:off x="8053452" y="4733344"/>
+              <a:ext cx="469900" cy="406400"/>
+            </a:xfrm>
+            <a:prstGeom prst="rect">
+              <a:avLst/>
+            </a:prstGeom>
+          </p:spPr>
+        </p:pic>
+        <p:pic>
+          <p:nvPicPr>
+            <p:cNvPr id="9" name="Picture 8">
+              <a:extLst>
+                <a:ext uri="{FF2B5EF4-FFF2-40B4-BE49-F238E27FC236}">
+                  <a16:creationId xmlns:a16="http://schemas.microsoft.com/office/drawing/2014/main" id="{46B02B42-F6AE-964F-8934-229300798BBA}"/>
+                </a:ext>
+              </a:extLst>
+            </p:cNvPr>
+            <p:cNvPicPr>
+              <a:picLocks noChangeAspect="1"/>
+            </p:cNvPicPr>
+            <p:nvPr/>
+          </p:nvPicPr>
+          <p:blipFill>
+            <a:blip r:embed="rId6"/>
+            <a:stretch>
+              <a:fillRect/>
+            </a:stretch>
+          </p:blipFill>
+          <p:spPr>
+            <a:xfrm>
+              <a:off x="6591998" y="1957231"/>
+              <a:ext cx="165100" cy="203200"/>
+            </a:xfrm>
+            <a:prstGeom prst="rect">
+              <a:avLst/>
+            </a:prstGeom>
+          </p:spPr>
+        </p:pic>
+        <p:sp>
+          <p:nvSpPr>
+            <p:cNvPr id="10" name="Oval 9">
+              <a:extLst>
+                <a:ext uri="{FF2B5EF4-FFF2-40B4-BE49-F238E27FC236}">
+                  <a16:creationId xmlns:a16="http://schemas.microsoft.com/office/drawing/2014/main" id="{374924E9-5746-D24D-93F7-0539661A1D59}"/>
+                </a:ext>
+              </a:extLst>
+            </p:cNvPr>
+            <p:cNvSpPr/>
+            <p:nvPr/>
+          </p:nvSpPr>
+          <p:spPr>
+            <a:xfrm>
+              <a:off x="6794679" y="2016394"/>
+              <a:ext cx="296215" cy="288075"/>
+            </a:xfrm>
+            <a:prstGeom prst="ellipse">
+              <a:avLst/>
+            </a:prstGeom>
+            <a:noFill/>
+          </p:spPr>
+          <p:style>
+            <a:lnRef idx="2">
+              <a:schemeClr val="dk1">
+                <a:shade val="50000"/>
+              </a:schemeClr>
+            </a:lnRef>
+            <a:fillRef idx="1">
+              <a:schemeClr val="dk1"/>
+            </a:fillRef>
+            <a:effectRef idx="0">
+              <a:schemeClr val="dk1"/>
+            </a:effectRef>
+            <a:fontRef idx="minor">
+              <a:schemeClr val="lt1"/>
+            </a:fontRef>
+          </p:style>
+          <p:txBody>
+            <a:bodyPr rtlCol="0" anchor="ctr"/>
+            <a:lstStyle/>
+            <a:p>
+              <a:pPr algn="ctr"/>
+              <a:endParaRPr lang="en-US"/>
+            </a:p>
+          </p:txBody>
+        </p:sp>
+        <p:sp>
+          <p:nvSpPr>
+            <p:cNvPr id="11" name="Oval 10">
+              <a:extLst>
+                <a:ext uri="{FF2B5EF4-FFF2-40B4-BE49-F238E27FC236}">
+                  <a16:creationId xmlns:a16="http://schemas.microsoft.com/office/drawing/2014/main" id="{AF7A252F-2B76-CD4A-BEDA-6BA9420984D3}"/>
+                </a:ext>
+              </a:extLst>
+            </p:cNvPr>
+            <p:cNvSpPr/>
+            <p:nvPr/>
+          </p:nvSpPr>
+          <p:spPr>
+            <a:xfrm flipV="1">
+              <a:off x="6897066" y="2128154"/>
+              <a:ext cx="91440" cy="91440"/>
+            </a:xfrm>
+            <a:prstGeom prst="ellipse">
+              <a:avLst/>
+            </a:prstGeom>
+          </p:spPr>
+          <p:style>
+            <a:lnRef idx="2">
+              <a:schemeClr val="dk1">
+                <a:shade val="50000"/>
+              </a:schemeClr>
+            </a:lnRef>
+            <a:fillRef idx="1">
+              <a:schemeClr val="dk1"/>
+            </a:fillRef>
+            <a:effectRef idx="0">
+              <a:schemeClr val="dk1"/>
+            </a:effectRef>
+            <a:fontRef idx="minor">
+              <a:schemeClr val="lt1"/>
+            </a:fontRef>
+          </p:style>
+          <p:txBody>
+            <a:bodyPr rtlCol="0" anchor="ctr"/>
+            <a:lstStyle/>
+            <a:p>
+              <a:pPr algn="ctr"/>
+              <a:endParaRPr lang="en-US"/>
+            </a:p>
+          </p:txBody>
+        </p:sp>
+        <p:cxnSp>
+          <p:nvCxnSpPr>
+            <p:cNvPr id="13" name="Straight Connector 12">
+              <a:extLst>
+                <a:ext uri="{FF2B5EF4-FFF2-40B4-BE49-F238E27FC236}">
+                  <a16:creationId xmlns:a16="http://schemas.microsoft.com/office/drawing/2014/main" id="{DFB1D40C-B6A9-2548-8C65-705947FEBD5F}"/>
+                </a:ext>
+              </a:extLst>
+            </p:cNvPr>
+            <p:cNvCxnSpPr/>
+            <p:nvPr/>
+          </p:nvCxnSpPr>
+          <p:spPr>
+            <a:xfrm flipH="1">
+              <a:off x="7418231" y="4281868"/>
+              <a:ext cx="231820" cy="99811"/>
+            </a:xfrm>
+            <a:prstGeom prst="line">
+              <a:avLst/>
+            </a:prstGeom>
+            <a:ln w="38100"/>
+          </p:spPr>
+          <p:style>
+            <a:lnRef idx="1">
+              <a:schemeClr val="dk1"/>
+            </a:lnRef>
+            <a:fillRef idx="0">
+              <a:schemeClr val="dk1"/>
+            </a:fillRef>
+            <a:effectRef idx="0">
+              <a:schemeClr val="dk1"/>
+            </a:effectRef>
+            <a:fontRef idx="minor">
+              <a:schemeClr val="tx1"/>
+            </a:fontRef>
+          </p:style>
+        </p:cxnSp>
+        <p:cxnSp>
+          <p:nvCxnSpPr>
+            <p:cNvPr id="14" name="Straight Connector 13">
+              <a:extLst>
+                <a:ext uri="{FF2B5EF4-FFF2-40B4-BE49-F238E27FC236}">
+                  <a16:creationId xmlns:a16="http://schemas.microsoft.com/office/drawing/2014/main" id="{6450DFEE-4766-8246-A149-205CF1C943D6}"/>
+                </a:ext>
+              </a:extLst>
+            </p:cNvPr>
+            <p:cNvCxnSpPr>
+              <a:cxnSpLocks/>
+            </p:cNvCxnSpPr>
+            <p:nvPr/>
+          </p:nvCxnSpPr>
+          <p:spPr>
+            <a:xfrm flipH="1" flipV="1">
+              <a:off x="7650051" y="4281868"/>
+              <a:ext cx="152400" cy="152400"/>
+            </a:xfrm>
+            <a:prstGeom prst="line">
+              <a:avLst/>
+            </a:prstGeom>
+            <a:ln w="38100"/>
+          </p:spPr>
+          <p:style>
+            <a:lnRef idx="1">
+              <a:schemeClr val="dk1"/>
+            </a:lnRef>
+            <a:fillRef idx="0">
+              <a:schemeClr val="dk1"/>
+            </a:fillRef>
+            <a:effectRef idx="0">
+              <a:schemeClr val="dk1"/>
+            </a:effectRef>
+            <a:fontRef idx="minor">
+              <a:schemeClr val="tx1"/>
+            </a:fontRef>
+          </p:style>
+        </p:cxnSp>
+        <p:cxnSp>
+          <p:nvCxnSpPr>
+            <p:cNvPr id="16" name="Straight Connector 15">
+              <a:extLst>
+                <a:ext uri="{FF2B5EF4-FFF2-40B4-BE49-F238E27FC236}">
+                  <a16:creationId xmlns:a16="http://schemas.microsoft.com/office/drawing/2014/main" id="{BEE7CB75-55D8-4C4B-BCC4-0535AAAEDD96}"/>
+                </a:ext>
+              </a:extLst>
+            </p:cNvPr>
+            <p:cNvCxnSpPr>
+              <a:cxnSpLocks/>
+            </p:cNvCxnSpPr>
+            <p:nvPr/>
+          </p:nvCxnSpPr>
+          <p:spPr>
+            <a:xfrm flipH="1" flipV="1">
+              <a:off x="7650051" y="4730125"/>
+              <a:ext cx="37564" cy="244340"/>
+            </a:xfrm>
+            <a:prstGeom prst="line">
+              <a:avLst/>
+            </a:prstGeom>
+            <a:ln w="38100"/>
+          </p:spPr>
+          <p:style>
+            <a:lnRef idx="1">
+              <a:schemeClr val="dk1"/>
+            </a:lnRef>
+            <a:fillRef idx="0">
+              <a:schemeClr val="dk1"/>
+            </a:fillRef>
+            <a:effectRef idx="0">
+              <a:schemeClr val="dk1"/>
+            </a:effectRef>
+            <a:fontRef idx="minor">
+              <a:schemeClr val="tx1"/>
+            </a:fontRef>
+          </p:style>
+        </p:cxnSp>
+        <p:cxnSp>
+          <p:nvCxnSpPr>
+            <p:cNvPr id="17" name="Straight Connector 16">
+              <a:extLst>
+                <a:ext uri="{FF2B5EF4-FFF2-40B4-BE49-F238E27FC236}">
+                  <a16:creationId xmlns:a16="http://schemas.microsoft.com/office/drawing/2014/main" id="{0CE7AB69-5B03-F049-9EB2-7CFFC837249E}"/>
+                </a:ext>
+              </a:extLst>
+            </p:cNvPr>
+            <p:cNvCxnSpPr>
+              <a:cxnSpLocks/>
+            </p:cNvCxnSpPr>
+            <p:nvPr/>
+          </p:nvCxnSpPr>
+          <p:spPr>
+            <a:xfrm flipH="1">
+              <a:off x="7687615" y="4974465"/>
+              <a:ext cx="234054" cy="0"/>
+            </a:xfrm>
+            <a:prstGeom prst="line">
+              <a:avLst/>
+            </a:prstGeom>
+            <a:ln w="38100"/>
+          </p:spPr>
+          <p:style>
+            <a:lnRef idx="1">
+              <a:schemeClr val="dk1"/>
+            </a:lnRef>
+            <a:fillRef idx="0">
+              <a:schemeClr val="dk1"/>
+            </a:fillRef>
+            <a:effectRef idx="0">
+              <a:schemeClr val="dk1"/>
+            </a:effectRef>
+            <a:fontRef idx="minor">
+              <a:schemeClr val="tx1"/>
+            </a:fontRef>
+          </p:style>
+        </p:cxnSp>
+      </p:grpSp>
+    </p:spTree>
+    <p:extLst>
+      <p:ext uri="{BB962C8B-B14F-4D97-AF65-F5344CB8AC3E}">
+        <p14:creationId xmlns:p14="http://schemas.microsoft.com/office/powerpoint/2010/main" val="2512226205"/>
+      </p:ext>
+    </p:extLst>
+  </p:cSld>
+  <p:clrMapOvr>
+    <a:masterClrMapping/>
+  </p:clrMapOvr>
+</p:sld>
+</file>
+
 <file path=ppt/theme/theme1.xml><?xml version="1.0" encoding="utf-8"?>
 <a:theme xmlns:a="http://schemas.openxmlformats.org/drawingml/2006/main" name="Office Theme">
   <a:themeElements>

</xml_diff>